<commit_message>
change header to Scouts BSA
</commit_message>
<xml_diff>
--- a/2020Mulch_Flyer.pptx
+++ b/2020Mulch_Flyer.pptx
@@ -163,6 +163,7 @@
 <p1510:revInfo xmlns:a="http://schemas.openxmlformats.org/drawingml/2006/main" xmlns:r="http://schemas.openxmlformats.org/officeDocument/2006/relationships" xmlns:p1510="http://schemas.microsoft.com/office/powerpoint/2015/10/main">
   <p1510:revLst>
     <p1510:client id="{0F5DF11A-B0C5-4C3A-B01E-E47E4CF8E6DC}" v="2" dt="2020-01-19T00:38:07.768"/>
+    <p1510:client id="{7FC955A8-0CFB-42A0-8036-B2958C14FF1D}" v="48" dt="2020-01-21T19:43:55.984"/>
     <p1510:client id="{9A5E7F4B-7822-4FEC-9C38-3F07C5718503}" v="4" dt="2020-01-20T21:24:17.574"/>
     <p1510:client id="{ADE363FA-95D8-4C45-8C5A-08EC77A2680C}" v="54" dt="2020-01-20T21:29:19.537"/>
     <p1510:client id="{CE09813E-A3AE-43B6-9980-55EAFEB3BAD2}" v="17" dt="2020-01-19T00:32:25.730"/>
@@ -4911,10 +4912,12 @@
           <a:p>
             <a:pPr algn="ctr"/>
             <a:r>
-              <a:rPr lang="en-US" altLang="en-US" sz="2000" b="1">
-                <a:cs typeface="Arial" panose="020B0604020202020204" pitchFamily="34" charset="0"/>
+              <a:rPr lang="en-US" altLang="en-US" sz="2000" b="1" dirty="0">
+                <a:latin typeface="Arial"/>
+                <a:ea typeface="ＭＳ Ｐゴシック"/>
+                <a:cs typeface="Arial"/>
               </a:rPr>
-              <a:t>Boy Scout Troops 1154 &amp; 1666</a:t>
+              <a:t>Scouts BSA Troops 1154 &amp; 1666</a:t>
             </a:r>
           </a:p>
           <a:p>
@@ -4926,14 +4929,14 @@
           <a:p>
             <a:pPr algn="ctr"/>
             <a:r>
-              <a:rPr lang="en-US" altLang="en-US" sz="2000" b="1">
+              <a:rPr lang="en-US" altLang="en-US" sz="2000" b="1" dirty="0">
                 <a:latin typeface="Arial"/>
                 <a:ea typeface="ＭＳ Ｐゴシック"/>
                 <a:cs typeface="Arial"/>
               </a:rPr>
               <a:t>Spring Mulch Sale 2020</a:t>
             </a:r>
-            <a:endParaRPr lang="en-US" altLang="en-US" sz="2000" b="1">
+            <a:endParaRPr lang="en-US" altLang="en-US" sz="2000" b="1" dirty="0">
               <a:cs typeface="Arial" panose="020B0604020202020204" pitchFamily="34" charset="0"/>
             </a:endParaRPr>
           </a:p>
@@ -5455,8 +5458,8 @@
         </p:nvSpPr>
         <p:spPr bwMode="auto">
           <a:xfrm>
-            <a:off x="294827" y="4366445"/>
-            <a:ext cx="5410200" cy="300037"/>
+            <a:off x="319612" y="4354045"/>
+            <a:ext cx="5496950" cy="299230"/>
           </a:xfrm>
           <a:prstGeom prst="rect">
             <a:avLst/>
@@ -5486,7 +5489,7 @@
           </a:extLst>
         </p:spPr>
         <p:txBody>
-          <a:bodyPr lIns="98215" tIns="49108" rIns="98215" bIns="49108">
+          <a:bodyPr wrap="square" lIns="98215" tIns="49108" rIns="98215" bIns="49108" anchor="t">
             <a:spAutoFit/>
           </a:bodyPr>
           <a:lstStyle>
@@ -5599,18 +5602,22 @@
           <a:p>
             <a:pPr algn="ctr" eaLnBrk="1" hangingPunct="1"/>
             <a:r>
-              <a:rPr lang="en-US" altLang="en-US" sz="1300" b="1">
-                <a:cs typeface="Times New Roman" panose="02020603050405020304" pitchFamily="18" charset="0"/>
+              <a:rPr lang="en-US" altLang="en-US" sz="1300" b="1" dirty="0">
+                <a:latin typeface="Arial"/>
+                <a:ea typeface="ＭＳ Ｐゴシック"/>
+                <a:cs typeface="Times New Roman"/>
               </a:rPr>
               <a:t>  </a:t>
             </a:r>
             <a:r>
-              <a:rPr lang="en-US" altLang="en-US" sz="1200" b="1">
-                <a:cs typeface="Arial" panose="020B0604020202020204" pitchFamily="34" charset="0"/>
+              <a:rPr lang="en-US" altLang="en-US" sz="1200" b="1" dirty="0">
+                <a:latin typeface="Arial"/>
+                <a:ea typeface="ＭＳ Ｐゴシック"/>
+                <a:cs typeface="Arial"/>
               </a:rPr>
-              <a:t>Ashburn Boy Scout Troops 1154  &amp; 1666 Hardwood Mulch Order Form  </a:t>
+              <a:t>Ashburn Scouts BSA Troops 1154 &amp;1666 Hardwood Mulch Order Form  </a:t>
             </a:r>
-            <a:endParaRPr lang="en-US" altLang="en-US" sz="1200">
+            <a:endParaRPr lang="en-US" altLang="en-US" sz="1200" dirty="0">
               <a:cs typeface="Arial" panose="020B0604020202020204" pitchFamily="34" charset="0"/>
             </a:endParaRPr>
           </a:p>
@@ -9513,7 +9520,7 @@
         </p:nvSpPr>
         <p:spPr bwMode="auto">
           <a:xfrm>
-            <a:off x="166688" y="3086565"/>
+            <a:off x="141906" y="3024574"/>
             <a:ext cx="7192048" cy="256246"/>
           </a:xfrm>
           <a:prstGeom prst="rect">
@@ -10482,7 +10489,7 @@
         <p:spPr bwMode="auto">
           <a:xfrm>
             <a:off x="2147888" y="3290888"/>
-            <a:ext cx="3657600" cy="868362"/>
+            <a:ext cx="3657600" cy="868617"/>
           </a:xfrm>
           <a:prstGeom prst="rect">
             <a:avLst/>
@@ -10512,7 +10519,7 @@
           </a:extLst>
         </p:spPr>
         <p:txBody>
-          <a:bodyPr lIns="98215" tIns="49108" rIns="98215" bIns="49108">
+          <a:bodyPr lIns="98215" tIns="49108" rIns="98215" bIns="49108" anchor="t">
             <a:spAutoFit/>
           </a:bodyPr>
           <a:lstStyle>
@@ -10625,8 +10632,10 @@
           <a:p>
             <a:pPr eaLnBrk="1" hangingPunct="1"/>
             <a:r>
-              <a:rPr lang="en-US" altLang="en-US" sz="1000" b="1" u="sng">
-                <a:cs typeface="Arial" panose="020B0604020202020204" pitchFamily="34" charset="0"/>
+              <a:rPr lang="en-US" altLang="en-US" sz="1000" b="1" u="sng" dirty="0">
+                <a:latin typeface="Arial"/>
+                <a:ea typeface="ＭＳ Ｐゴシック"/>
+                <a:cs typeface="Arial"/>
               </a:rPr>
               <a:t>To Order by Mail:</a:t>
             </a:r>
@@ -10634,8 +10643,10 @@
           <a:p>
             <a:pPr eaLnBrk="1" hangingPunct="1"/>
             <a:r>
-              <a:rPr lang="en-US" altLang="en-US" sz="1000">
-                <a:cs typeface="Arial" panose="020B0604020202020204" pitchFamily="34" charset="0"/>
+              <a:rPr lang="en-US" altLang="en-US" sz="1000" dirty="0">
+                <a:latin typeface="Arial"/>
+                <a:ea typeface="ＭＳ Ｐゴシック"/>
+                <a:cs typeface="Arial"/>
               </a:rPr>
               <a:t>1. Fill out the order form shown below completely</a:t>
             </a:r>
@@ -10643,36 +10654,49 @@
           <a:p>
             <a:pPr eaLnBrk="1" hangingPunct="1"/>
             <a:r>
-              <a:rPr lang="en-US" altLang="en-US" sz="1000">
-                <a:cs typeface="Arial" panose="020B0604020202020204" pitchFamily="34" charset="0"/>
+              <a:rPr lang="en-US" altLang="en-US" sz="1000" dirty="0">
+                <a:latin typeface="Arial"/>
+                <a:ea typeface="ＭＳ Ｐゴシック"/>
+                <a:cs typeface="Arial"/>
               </a:rPr>
               <a:t>2. Make Check Payable to </a:t>
             </a:r>
             <a:r>
-              <a:rPr lang="en-US" altLang="en-US" sz="1000" b="1">
-                <a:cs typeface="Arial" panose="020B0604020202020204" pitchFamily="34" charset="0"/>
+              <a:rPr lang="en-US" altLang="en-US" sz="1000" b="1" dirty="0">
+                <a:latin typeface="Arial"/>
+                <a:ea typeface="ＭＳ Ｐゴシック"/>
+                <a:cs typeface="Arial"/>
               </a:rPr>
               <a:t>Troop 1154</a:t>
             </a:r>
           </a:p>
           <a:p>
             <a:r>
-              <a:rPr lang="en-US" altLang="en-US" sz="1000">
-                <a:cs typeface="Arial" panose="020B0604020202020204" pitchFamily="34" charset="0"/>
+              <a:rPr lang="en-US" altLang="en-US" sz="1000" dirty="0">
+                <a:latin typeface="Arial"/>
+                <a:ea typeface="ＭＳ Ｐゴシック"/>
+                <a:cs typeface="Arial"/>
               </a:rPr>
               <a:t>3. Mail order form and payment to: </a:t>
             </a:r>
             <a:r>
-              <a:rPr lang="en-US" altLang="en-US" sz="1000" b="1">
-                <a:cs typeface="Arial" panose="020B0604020202020204" pitchFamily="34" charset="0"/>
+              <a:rPr lang="en-US" altLang="en-US" sz="1000" b="1" dirty="0">
+                <a:latin typeface="Arial"/>
+                <a:ea typeface="ＭＳ Ｐゴシック"/>
+                <a:cs typeface="Arial"/>
               </a:rPr>
-              <a:t>Troop 1154 Mulch Sale, </a:t>
+              <a:t>Troop 1154 Mulch Sale, </a:t>
             </a:r>
+            <a:endParaRPr lang="en-US" altLang="en-US" sz="1000" b="1" dirty="0">
+              <a:cs typeface="Arial"/>
+            </a:endParaRPr>
           </a:p>
           <a:p>
             <a:r>
-              <a:rPr lang="en-US" altLang="en-US" sz="1000" b="1">
-                <a:cs typeface="Arial" panose="020B0604020202020204" pitchFamily="34" charset="0"/>
+              <a:rPr lang="en-US" altLang="en-US" sz="1000" b="1" dirty="0">
+                <a:latin typeface="Arial"/>
+                <a:ea typeface="ＭＳ Ｐゴシック"/>
+                <a:cs typeface="Arial"/>
               </a:rPr>
               <a:t>	P.O. Box 4155, Ashburn, VA 20148</a:t>
             </a:r>
@@ -13575,8 +13599,8 @@
         </p:nvSpPr>
         <p:spPr bwMode="auto">
           <a:xfrm>
-            <a:off x="5576888" y="4390257"/>
-            <a:ext cx="1754187" cy="252413"/>
+            <a:off x="5552103" y="4353057"/>
+            <a:ext cx="1778972" cy="252413"/>
           </a:xfrm>
           <a:prstGeom prst="rect">
             <a:avLst/>
@@ -13606,7 +13630,7 @@
           </a:extLst>
         </p:spPr>
         <p:txBody>
-          <a:bodyPr lIns="98215" tIns="49108" rIns="98215" bIns="49108">
+          <a:bodyPr wrap="square" lIns="98215" tIns="49108" rIns="98215" bIns="49108">
             <a:spAutoFit/>
           </a:bodyPr>
           <a:lstStyle>

</xml_diff>